<commit_message>
updated ppt and others
</commit_message>
<xml_diff>
--- a/ETL Project Presentation.pptx
+++ b/ETL Project Presentation.pptx
@@ -7,7 +7,7 @@
   <p:sldIdLst>
     <p:sldId id="256" r:id="rId2"/>
     <p:sldId id="257" r:id="rId3"/>
-    <p:sldId id="258" r:id="rId4"/>
+    <p:sldId id="264" r:id="rId4"/>
     <p:sldId id="259" r:id="rId5"/>
     <p:sldId id="260" r:id="rId6"/>
     <p:sldId id="261" r:id="rId7"/>
@@ -110,6 +110,11 @@
       </a:defRPr>
     </a:lvl9pPr>
   </p:defaultTextStyle>
+  <p:extLst>
+    <p:ext uri="{EFAFB233-063F-42B5-8137-9DF3F51BA10A}">
+      <p15:sldGuideLst xmlns:p15="http://schemas.microsoft.com/office/powerpoint/2012/main"/>
+    </p:ext>
+  </p:extLst>
 </p:presentation>
 </file>
 
@@ -4862,10 +4867,10 @@
       </p:grpSpPr>
       <p:sp useBgFill="1">
         <p:nvSpPr>
-          <p:cNvPr id="10" name="Rectangle 9">
-            <a:extLst>
-              <a:ext uri="{FF2B5EF4-FFF2-40B4-BE49-F238E27FC236}">
-                <a16:creationId xmlns:a16="http://schemas.microsoft.com/office/drawing/2014/main" id="{0671A8AE-40A1-4631-A6B8-581AFF065482}"/>
+          <p:cNvPr id="21" name="Rectangle 20">
+            <a:extLst>
+              <a:ext uri="{FF2B5EF4-FFF2-40B4-BE49-F238E27FC236}">
+                <a16:creationId xmlns:a16="http://schemas.microsoft.com/office/drawing/2014/main" id="{9AA72BD9-2C5A-4EDC-931F-5AA08EACA0F3}"/>
               </a:ext>
               <a:ext uri="{C183D7F6-B498-43B3-948B-1728B52AA6E4}">
                 <adec:decorative xmlns:adec="http://schemas.microsoft.com/office/drawing/2017/decorative" val="1"/>
@@ -4922,10 +4927,10 @@
       </p:sp>
       <p:pic>
         <p:nvPicPr>
-          <p:cNvPr id="5" name="Content Placeholder 4" descr="Padlock on computer motherboard">
-            <a:extLst>
-              <a:ext uri="{FF2B5EF4-FFF2-40B4-BE49-F238E27FC236}">
-                <a16:creationId xmlns:a16="http://schemas.microsoft.com/office/drawing/2014/main" id="{C687A07D-74A1-453F-A278-057C3EBEA8AD}"/>
+          <p:cNvPr id="7" name="Content Placeholder 6" descr="A picture containing background pattern&#10;&#10;Description automatically generated">
+            <a:extLst>
+              <a:ext uri="{FF2B5EF4-FFF2-40B4-BE49-F238E27FC236}">
+                <a16:creationId xmlns:a16="http://schemas.microsoft.com/office/drawing/2014/main" id="{30D37800-E072-49ED-A679-F5B270D96CED}"/>
               </a:ext>
             </a:extLst>
           </p:cNvPr>
@@ -4944,13 +4949,13 @@
               </a:ext>
             </a:extLst>
           </a:blip>
-          <a:srcRect r="23298" b="9091"/>
+          <a:srcRect t="9091" r="42825" b="-1"/>
           <a:stretch/>
         </p:blipFill>
         <p:spPr>
           <a:xfrm>
-            <a:off x="3523488" y="10"/>
-            <a:ext cx="8668512" cy="6857990"/>
+            <a:off x="3522468" y="10"/>
+            <a:ext cx="8669532" cy="6857990"/>
           </a:xfrm>
           <a:prstGeom prst="rect">
             <a:avLst/>
@@ -4959,10 +4964,10 @@
       </p:pic>
       <p:sp>
         <p:nvSpPr>
-          <p:cNvPr id="12" name="Rectangle 11">
-            <a:extLst>
-              <a:ext uri="{FF2B5EF4-FFF2-40B4-BE49-F238E27FC236}">
-                <a16:creationId xmlns:a16="http://schemas.microsoft.com/office/drawing/2014/main" id="{AB58EF07-17C2-48CF-ABB0-EEF1F17CB8F0}"/>
+          <p:cNvPr id="23" name="Rectangle 22">
+            <a:extLst>
+              <a:ext uri="{FF2B5EF4-FFF2-40B4-BE49-F238E27FC236}">
+                <a16:creationId xmlns:a16="http://schemas.microsoft.com/office/drawing/2014/main" id="{DD3981AC-7B61-4947-BCF3-F7AA7FA385B9}"/>
               </a:ext>
               <a:ext uri="{C183D7F6-B498-43B3-948B-1728B52AA6E4}">
                 <adec:decorative xmlns:adec="http://schemas.microsoft.com/office/drawing/2017/decorative" val="1"/>
@@ -4982,8 +4987,8 @@
         </p:nvSpPr>
         <p:spPr>
           <a:xfrm>
-            <a:off x="3" y="0"/>
-            <a:ext cx="9339206" cy="6858000"/>
+            <a:off x="2" y="0"/>
+            <a:ext cx="9756601" cy="6858000"/>
           </a:xfrm>
           <a:prstGeom prst="rect">
             <a:avLst/>
@@ -4993,9 +4998,14 @@
               <a:gs pos="58000">
                 <a:schemeClr val="bg1"/>
               </a:gs>
-              <a:gs pos="33000">
+              <a:gs pos="35000">
                 <a:schemeClr val="bg1">
-                  <a:alpha val="64000"/>
+                  <a:alpha val="78000"/>
+                </a:schemeClr>
+              </a:gs>
+              <a:gs pos="19000">
+                <a:schemeClr val="bg1">
+                  <a:alpha val="38000"/>
                 </a:schemeClr>
               </a:gs>
               <a:gs pos="0">
@@ -5056,19 +5066,18 @@
         </p:nvSpPr>
         <p:spPr>
           <a:xfrm>
-            <a:off x="398543" y="1806701"/>
-            <a:ext cx="4792011" cy="3244597"/>
+            <a:off x="371094" y="1161288"/>
+            <a:ext cx="3438144" cy="1124712"/>
           </a:xfrm>
         </p:spPr>
         <p:txBody>
-          <a:bodyPr vert="horz" lIns="91440" tIns="45720" rIns="91440" bIns="45720" rtlCol="0" anchor="ctr">
-            <a:noAutofit/>
+          <a:bodyPr vert="horz" lIns="91440" tIns="45720" rIns="91440" bIns="45720" rtlCol="0" anchor="b">
+            <a:normAutofit/>
           </a:bodyPr>
           <a:lstStyle/>
           <a:p>
-            <a:pPr algn="ctr"/>
-            <a:r>
-              <a:rPr lang="en-US" sz="13400" dirty="0"/>
+            <a:r>
+              <a:rPr lang="en-US" sz="7200" dirty="0"/>
               <a:t>350+</a:t>
             </a:r>
           </a:p>
@@ -5076,10 +5085,10 @@
       </p:sp>
       <p:sp>
         <p:nvSpPr>
-          <p:cNvPr id="14" name="Rectangle 13">
-            <a:extLst>
-              <a:ext uri="{FF2B5EF4-FFF2-40B4-BE49-F238E27FC236}">
-                <a16:creationId xmlns:a16="http://schemas.microsoft.com/office/drawing/2014/main" id="{AF2F604E-43BE-4DC3-B983-E071523364F8}"/>
+          <p:cNvPr id="25" name="Rectangle 24">
+            <a:extLst>
+              <a:ext uri="{FF2B5EF4-FFF2-40B4-BE49-F238E27FC236}">
+                <a16:creationId xmlns:a16="http://schemas.microsoft.com/office/drawing/2014/main" id="{55D4142C-5077-457F-A6AD-3FECFDB39685}"/>
               </a:ext>
               <a:ext uri="{C183D7F6-B498-43B3-948B-1728B52AA6E4}">
                 <adec:decorative xmlns:adec="http://schemas.microsoft.com/office/drawing/2017/decorative" val="1"/>
@@ -5099,8 +5108,8 @@
         </p:nvSpPr>
         <p:spPr>
           <a:xfrm rot="5400000">
-            <a:off x="759921" y="346791"/>
-            <a:ext cx="146304" cy="704088"/>
+            <a:off x="662559" y="605790"/>
+            <a:ext cx="73152" cy="548640"/>
           </a:xfrm>
           <a:prstGeom prst="rect">
             <a:avLst/>
@@ -5144,10 +5153,10 @@
       </p:sp>
       <p:sp>
         <p:nvSpPr>
-          <p:cNvPr id="16" name="Rectangle 15">
-            <a:extLst>
-              <a:ext uri="{FF2B5EF4-FFF2-40B4-BE49-F238E27FC236}">
-                <a16:creationId xmlns:a16="http://schemas.microsoft.com/office/drawing/2014/main" id="{08C9B587-E65E-4B52-B37C-ABEBB6E87928}"/>
+          <p:cNvPr id="27" name="Rectangle 26">
+            <a:extLst>
+              <a:ext uri="{FF2B5EF4-FFF2-40B4-BE49-F238E27FC236}">
+                <a16:creationId xmlns:a16="http://schemas.microsoft.com/office/drawing/2014/main" id="{7A5F0580-5EE9-419F-96EE-B6529EF6E7D0}"/>
               </a:ext>
               <a:ext uri="{C183D7F6-B498-43B3-948B-1728B52AA6E4}">
                 <adec:decorative xmlns:adec="http://schemas.microsoft.com/office/drawing/2017/decorative" val="1"/>
@@ -5167,8 +5176,8 @@
         </p:nvSpPr>
         <p:spPr>
           <a:xfrm>
-            <a:off x="481029" y="4546920"/>
-            <a:ext cx="3977640" cy="18288"/>
+            <a:off x="428244" y="2443480"/>
+            <a:ext cx="3300984" cy="18288"/>
           </a:xfrm>
           <a:prstGeom prst="rect">
             <a:avLst/>
@@ -5251,16 +5260,16 @@
         </p:nvSpPr>
         <p:spPr>
           <a:xfrm>
-            <a:off x="57622" y="3207342"/>
-            <a:ext cx="5075313" cy="3204134"/>
+            <a:off x="371094" y="2718054"/>
+            <a:ext cx="3438906" cy="3207258"/>
           </a:xfrm>
           <a:prstGeom prst="rect">
             <a:avLst/>
           </a:prstGeom>
         </p:spPr>
         <p:txBody>
-          <a:bodyPr vert="horz" lIns="91440" tIns="45720" rIns="91440" bIns="45720" rtlCol="0" anchor="b">
-            <a:noAutofit/>
+          <a:bodyPr vert="horz" lIns="91440" tIns="45720" rIns="91440" bIns="45720" rtlCol="0" anchor="t">
+            <a:normAutofit/>
           </a:bodyPr>
           <a:lstStyle>
             <a:lvl1pPr algn="l" defTabSz="914400" rtl="0" eaLnBrk="1" latinLnBrk="0" hangingPunct="1">
@@ -5282,8 +5291,17 @@
             </a:lvl1pPr>
           </a:lstStyle>
           <a:p>
-            <a:r>
-              <a:rPr lang="en-US" sz="13400" dirty="0"/>
+            <a:pPr>
+              <a:spcAft>
+                <a:spcPts val="600"/>
+              </a:spcAft>
+            </a:pPr>
+            <a:r>
+              <a:rPr lang="en-US" sz="6000" dirty="0">
+                <a:latin typeface="+mn-lt"/>
+                <a:ea typeface="+mn-ea"/>
+                <a:cs typeface="+mn-cs"/>
+              </a:rPr>
               <a:t>10,000</a:t>
             </a:r>
           </a:p>
@@ -5292,7 +5310,7 @@
     </p:spTree>
     <p:extLst>
       <p:ext uri="{BB962C8B-B14F-4D97-AF65-F5344CB8AC3E}">
-        <p14:creationId xmlns:p14="http://schemas.microsoft.com/office/powerpoint/2010/main" val="1780259919"/>
+        <p14:creationId xmlns:p14="http://schemas.microsoft.com/office/powerpoint/2010/main" val="3979706991"/>
       </p:ext>
     </p:extLst>
   </p:cSld>
@@ -6228,6 +6246,103 @@
           </a:custGeom>
         </p:spPr>
       </p:pic>
+      <p:sp>
+        <p:nvSpPr>
+          <p:cNvPr id="8" name="Title 1">
+            <a:extLst>
+              <a:ext uri="{FF2B5EF4-FFF2-40B4-BE49-F238E27FC236}">
+                <a16:creationId xmlns:a16="http://schemas.microsoft.com/office/drawing/2014/main" id="{9F2E4E6E-2530-4B49-ADE5-5BB270A951A4}"/>
+              </a:ext>
+            </a:extLst>
+          </p:cNvPr>
+          <p:cNvSpPr txBox="1">
+            <a:spLocks/>
+          </p:cNvSpPr>
+          <p:nvPr/>
+        </p:nvSpPr>
+        <p:spPr>
+          <a:xfrm>
+            <a:off x="6924750" y="2834495"/>
+            <a:ext cx="5267250" cy="1613680"/>
+          </a:xfrm>
+          <a:prstGeom prst="rect">
+            <a:avLst/>
+          </a:prstGeom>
+        </p:spPr>
+        <p:txBody>
+          <a:bodyPr vert="horz" lIns="91440" tIns="45720" rIns="91440" bIns="45720" rtlCol="0" anchor="t">
+            <a:normAutofit/>
+          </a:bodyPr>
+          <a:lstStyle>
+            <a:lvl1pPr algn="l" defTabSz="914400" rtl="0" eaLnBrk="1" latinLnBrk="0" hangingPunct="1">
+              <a:lnSpc>
+                <a:spcPct val="90000"/>
+              </a:lnSpc>
+              <a:spcBef>
+                <a:spcPct val="0"/>
+              </a:spcBef>
+              <a:buNone/>
+              <a:defRPr sz="4400" kern="1200">
+                <a:solidFill>
+                  <a:schemeClr val="tx1"/>
+                </a:solidFill>
+                <a:latin typeface="+mj-lt"/>
+                <a:ea typeface="+mj-ea"/>
+                <a:cs typeface="+mj-cs"/>
+              </a:defRPr>
+            </a:lvl1pPr>
+          </a:lstStyle>
+          <a:p>
+            <a:pPr marL="1143000" indent="-1143000">
+              <a:buFont typeface="Arial" panose="020B0604020202020204" pitchFamily="34" charset="0"/>
+              <a:buChar char="•"/>
+            </a:pPr>
+            <a:r>
+              <a:rPr lang="en-US" sz="3200" dirty="0" err="1">
+                <a:solidFill>
+                  <a:srgbClr val="000000"/>
+                </a:solidFill>
+              </a:rPr>
+              <a:t>BeautifulSoup</a:t>
+            </a:r>
+            <a:r>
+              <a:rPr lang="en-US" sz="3200" dirty="0">
+                <a:solidFill>
+                  <a:srgbClr val="000000"/>
+                </a:solidFill>
+              </a:rPr>
+              <a:t> for </a:t>
+            </a:r>
+            <a:r>
+              <a:rPr lang="en-US" sz="3200" dirty="0" err="1">
+                <a:solidFill>
+                  <a:srgbClr val="000000"/>
+                </a:solidFill>
+              </a:rPr>
+              <a:t>webscraping</a:t>
+            </a:r>
+            <a:endParaRPr lang="en-US" sz="3200" dirty="0">
+              <a:solidFill>
+                <a:srgbClr val="000000"/>
+              </a:solidFill>
+            </a:endParaRPr>
+          </a:p>
+          <a:p>
+            <a:pPr marL="1143000" indent="-1143000">
+              <a:buFont typeface="Arial" panose="020B0604020202020204" pitchFamily="34" charset="0"/>
+              <a:buChar char="•"/>
+            </a:pPr>
+            <a:r>
+              <a:rPr lang="en-US" sz="3200" dirty="0">
+                <a:solidFill>
+                  <a:srgbClr val="000000"/>
+                </a:solidFill>
+              </a:rPr>
+              <a:t>For Loop extract list</a:t>
+            </a:r>
+          </a:p>
+        </p:txBody>
+      </p:sp>
     </p:spTree>
     <p:extLst>
       <p:ext uri="{BB962C8B-B14F-4D97-AF65-F5344CB8AC3E}">
@@ -6416,7 +6531,7 @@
         <p:spPr>
           <a:xfrm>
             <a:off x="6286500" y="1815320"/>
-            <a:ext cx="5305425" cy="1547005"/>
+            <a:ext cx="5305425" cy="765955"/>
           </a:xfrm>
         </p:spPr>
         <p:txBody>
@@ -6697,6 +6812,110 @@
           </a:custGeom>
         </p:spPr>
       </p:pic>
+      <p:sp>
+        <p:nvSpPr>
+          <p:cNvPr id="8" name="Title 1">
+            <a:extLst>
+              <a:ext uri="{FF2B5EF4-FFF2-40B4-BE49-F238E27FC236}">
+                <a16:creationId xmlns:a16="http://schemas.microsoft.com/office/drawing/2014/main" id="{B8186064-9AAF-43BC-89EF-51BAFB1D3E99}"/>
+              </a:ext>
+            </a:extLst>
+          </p:cNvPr>
+          <p:cNvSpPr txBox="1">
+            <a:spLocks/>
+          </p:cNvSpPr>
+          <p:nvPr/>
+        </p:nvSpPr>
+        <p:spPr>
+          <a:xfrm>
+            <a:off x="6421721" y="2663045"/>
+            <a:ext cx="5305425" cy="1423180"/>
+          </a:xfrm>
+          <a:prstGeom prst="rect">
+            <a:avLst/>
+          </a:prstGeom>
+        </p:spPr>
+        <p:txBody>
+          <a:bodyPr vert="horz" lIns="91440" tIns="45720" rIns="91440" bIns="45720" rtlCol="0" anchor="t">
+            <a:normAutofit/>
+          </a:bodyPr>
+          <a:lstStyle>
+            <a:lvl1pPr algn="l" defTabSz="914400" rtl="0" eaLnBrk="1" latinLnBrk="0" hangingPunct="1">
+              <a:lnSpc>
+                <a:spcPct val="90000"/>
+              </a:lnSpc>
+              <a:spcBef>
+                <a:spcPct val="0"/>
+              </a:spcBef>
+              <a:buNone/>
+              <a:defRPr sz="4400" kern="1200">
+                <a:solidFill>
+                  <a:schemeClr val="tx1"/>
+                </a:solidFill>
+                <a:latin typeface="+mj-lt"/>
+                <a:ea typeface="+mj-ea"/>
+                <a:cs typeface="+mj-cs"/>
+              </a:defRPr>
+            </a:lvl1pPr>
+          </a:lstStyle>
+          <a:p>
+            <a:pPr marL="685800" indent="-685800">
+              <a:buFont typeface="Arial" panose="020B0604020202020204" pitchFamily="34" charset="0"/>
+              <a:buChar char="•"/>
+            </a:pPr>
+            <a:r>
+              <a:rPr lang="en-US" sz="2400" dirty="0">
+                <a:solidFill>
+                  <a:srgbClr val="000000"/>
+                </a:solidFill>
+              </a:rPr>
+              <a:t>Removing excess data</a:t>
+            </a:r>
+          </a:p>
+          <a:p>
+            <a:pPr marL="685800" indent="-685800">
+              <a:buFont typeface="Arial" panose="020B0604020202020204" pitchFamily="34" charset="0"/>
+              <a:buChar char="•"/>
+            </a:pPr>
+            <a:r>
+              <a:rPr lang="en-US" sz="2400" dirty="0">
+                <a:solidFill>
+                  <a:srgbClr val="000000"/>
+                </a:solidFill>
+              </a:rPr>
+              <a:t>Removing certain null data</a:t>
+            </a:r>
+          </a:p>
+          <a:p>
+            <a:pPr marL="685800" indent="-685800">
+              <a:buFont typeface="Arial" panose="020B0604020202020204" pitchFamily="34" charset="0"/>
+              <a:buChar char="•"/>
+            </a:pPr>
+            <a:r>
+              <a:rPr lang="en-US" sz="2400" dirty="0">
+                <a:solidFill>
+                  <a:srgbClr val="000000"/>
+                </a:solidFill>
+              </a:rPr>
+              <a:t>Renamed columns</a:t>
+            </a:r>
+          </a:p>
+          <a:p>
+            <a:pPr marL="685800" indent="-685800">
+              <a:buFont typeface="Arial" panose="020B0604020202020204" pitchFamily="34" charset="0"/>
+              <a:buChar char="•"/>
+            </a:pPr>
+            <a:r>
+              <a:rPr lang="en-US" sz="2400" dirty="0">
+                <a:solidFill>
+                  <a:srgbClr val="000000"/>
+                </a:solidFill>
+              </a:rPr>
+              <a:t>Checked for duplicates</a:t>
+            </a:r>
+          </a:p>
+        </p:txBody>
+      </p:sp>
     </p:spTree>
     <p:extLst>
       <p:ext uri="{BB962C8B-B14F-4D97-AF65-F5344CB8AC3E}">

</xml_diff>